<commit_message>
Cleaned up the GAN slide.
</commit_message>
<xml_diff>
--- a/gan_getting_started.pptx
+++ b/gan_getting_started.pptx
@@ -5,17 +5,18 @@
     <p:sldMasterId id="2147483648" r:id="rId1"/>
   </p:sldMasterIdLst>
   <p:notesMasterIdLst>
-    <p:notesMasterId r:id="rId10"/>
+    <p:notesMasterId r:id="rId11"/>
   </p:notesMasterIdLst>
   <p:sldIdLst>
     <p:sldId id="257" r:id="rId2"/>
     <p:sldId id="307" r:id="rId3"/>
-    <p:sldId id="278" r:id="rId4"/>
-    <p:sldId id="308" r:id="rId5"/>
-    <p:sldId id="309" r:id="rId6"/>
-    <p:sldId id="279" r:id="rId7"/>
+    <p:sldId id="308" r:id="rId4"/>
+    <p:sldId id="309" r:id="rId5"/>
+    <p:sldId id="279" r:id="rId6"/>
+    <p:sldId id="306" r:id="rId7"/>
     <p:sldId id="262" r:id="rId8"/>
-    <p:sldId id="306" r:id="rId9"/>
+    <p:sldId id="310" r:id="rId9"/>
+    <p:sldId id="278" r:id="rId10"/>
   </p:sldIdLst>
   <p:sldSz cx="12192000" cy="6858000"/>
   <p:notesSz cx="6858000" cy="9144000"/>
@@ -620,7 +621,7 @@
                 <a:effectLst/>
                 <a:latin typeface="walsheim"/>
               </a:rPr>
-              <a:t>The power of creativity was always the exclusive domain of the human mind. This was one of the facts touted as one of the major differences between the human mind and the artificial intelligence domain. However, in the recent past, deep learning has been making baby steps in the path to being creative. Imagine you were at the Sistine Chapel in the Vatican and were looking up with bewilderment at the frescos immortalized by Michelangelo, wishing your deep learning models were able to recreate something like that. Well, maybe 10 years back, people would have scoffed at your thought. Not anymore, though – deep learning models have made great strides in regenerating immortal works. Applications like these are made possible by a class of networks called </a:t>
+              <a:t>The power of creativity has always been the exclusive domain of the human mind. This was one of the facts touted as one of the major differences between the human mind and the artificial intelligence domain. However, deep learning has been making baby steps to being creative. Imagine you were at the Sistine Chapel in the Vatican and were looking up with bewilderment at the frescos immortalized by Michelangelo, wishing your deep learning models were able to recreate something like that. Well, maybe 10 years back, people would have scoffed at your thought. Not anymore, though – deep learning models have made great strides in regenerating immortal works. Applications like these are made possible by a class of networks called </a:t>
             </a:r>
             <a:r>
               <a:rPr lang="en-US" b="1" i="0" dirty="0">
@@ -896,31 +897,31 @@
           <a:p>
             <a:pPr algn="l"/>
             <a:r>
-              <a:rPr lang="en-US" sz="1800" b="0" i="0" u="none" strike="noStrike" baseline="0" dirty="0">
+              <a:rPr lang="en-US" sz="1200" b="0" i="0" u="none" strike="noStrike" baseline="0" dirty="0">
                 <a:latin typeface="OpenSans"/>
               </a:rPr>
               <a:t>GANs are used to create a data distribution from random noise data and make it look similar to a real data distribution. GANs are a family of deep neural networks that comprise two networks that are competing against each other. One of these networks is called the </a:t>
             </a:r>
             <a:r>
-              <a:rPr lang="en-US" sz="1800" b="1" i="0" u="none" strike="noStrike" baseline="0" dirty="0">
+              <a:rPr lang="en-US" sz="1200" b="1" i="0" u="none" strike="noStrike" baseline="0" dirty="0">
                 <a:latin typeface="OpenSans-Bold"/>
               </a:rPr>
               <a:t>generator network</a:t>
             </a:r>
             <a:r>
-              <a:rPr lang="en-US" sz="1800" b="0" i="0" u="none" strike="noStrike" baseline="0" dirty="0">
+              <a:rPr lang="en-US" sz="1200" b="0" i="0" u="none" strike="noStrike" baseline="0" dirty="0">
                 <a:latin typeface="OpenSans"/>
               </a:rPr>
               <a:t>, while the other is called the </a:t>
             </a:r>
             <a:r>
-              <a:rPr lang="en-US" sz="1800" b="1" i="0" u="none" strike="noStrike" baseline="0" dirty="0">
+              <a:rPr lang="en-US" sz="1200" b="1" i="0" u="none" strike="noStrike" baseline="0" dirty="0">
                 <a:latin typeface="OpenSans-Bold"/>
               </a:rPr>
               <a:t>discriminator network</a:t>
             </a:r>
             <a:r>
-              <a:rPr lang="en-US" sz="1800" b="0" i="0" u="none" strike="noStrike" baseline="0" dirty="0">
+              <a:rPr lang="en-US" sz="1200" b="0" i="0" u="none" strike="noStrike" baseline="0" dirty="0">
                 <a:latin typeface="OpenSans"/>
               </a:rPr>
               <a:t>. The functions of these two networks are to compete against each other to generate a probability distribution that closely mimics an existing probability distribution. To state an example of generating a new probability distribution, let's say we have a collection of images of cats and dogs (real images). Using a GAN, we can generate a different set of images (fake images) of cats and dogs from a very random distribution of numbers. The success of a GAN is in generating the best set of cat and dog images to the point that it is difficult for people to differentiate between the fake ones and the real ones.</a:t>
@@ -928,14 +929,14 @@
           </a:p>
           <a:p>
             <a:pPr algn="l"/>
-            <a:endParaRPr lang="en-US" sz="1800" b="0" i="0" u="none" strike="noStrike" baseline="0" dirty="0">
+            <a:endParaRPr lang="en-US" sz="1200" b="0" i="0" u="none" strike="noStrike" baseline="0" dirty="0">
               <a:latin typeface="OpenSans"/>
             </a:endParaRPr>
           </a:p>
           <a:p>
             <a:pPr algn="l"/>
             <a:r>
-              <a:rPr lang="en-US" sz="1800" b="0" i="0" u="none" strike="noStrike" baseline="0" dirty="0">
+              <a:rPr lang="en-US" sz="1200" b="0" i="0" u="none" strike="noStrike" baseline="0" dirty="0">
                 <a:latin typeface="OpenSans"/>
               </a:rPr>
               <a:t>The figure above provides a concise overview of the components of a GAN and how they come in handy in generating fake images from real ones. Let's understand the process in the context of the preceding diagram:</a:t>
@@ -943,14 +944,14 @@
           </a:p>
           <a:p>
             <a:pPr algn="l"/>
-            <a:endParaRPr lang="en-US" sz="1800" b="0" i="0" u="none" strike="noStrike" baseline="0" dirty="0">
+            <a:endParaRPr lang="en-US" sz="1200" b="0" i="0" u="none" strike="noStrike" baseline="0" dirty="0">
               <a:latin typeface="OpenSans"/>
             </a:endParaRPr>
           </a:p>
           <a:p>
             <a:pPr algn="l"/>
             <a:r>
-              <a:rPr lang="en-US" sz="1800" b="0" i="0" u="none" strike="noStrike" baseline="0" dirty="0">
+              <a:rPr lang="en-US" sz="1200" b="0" i="0" u="none" strike="noStrike" baseline="0" dirty="0">
                 <a:latin typeface="OpenSans"/>
               </a:rPr>
               <a:t>1. The set of images at the top-left corner of the preceding figure represents a probability distribution of real data (for example, MNIST, images of cats and dogs, pictures of human faces, and more).</a:t>
@@ -958,14 +959,14 @@
           </a:p>
           <a:p>
             <a:pPr algn="l"/>
-            <a:endParaRPr lang="en-US" sz="1800" b="0" i="0" u="none" strike="noStrike" baseline="0" dirty="0">
+            <a:endParaRPr lang="en-US" sz="1200" b="0" i="0" u="none" strike="noStrike" baseline="0" dirty="0">
               <a:latin typeface="OpenSans"/>
             </a:endParaRPr>
           </a:p>
           <a:p>
             <a:pPr algn="l"/>
             <a:r>
-              <a:rPr lang="en-US" sz="1800" b="0" i="0" u="none" strike="noStrike" baseline="0" dirty="0">
+              <a:rPr lang="en-US" sz="1200" b="0" i="0" u="none" strike="noStrike" baseline="0" dirty="0">
                 <a:latin typeface="OpenSans"/>
               </a:rPr>
               <a:t>2. The generative network shown in the bottom-left part of the diagram generates fake images (probability distributions) from a random noise distribution.</a:t>
@@ -973,14 +974,14 @@
           </a:p>
           <a:p>
             <a:pPr algn="l"/>
-            <a:endParaRPr lang="en-US" sz="1800" b="0" i="0" u="none" strike="noStrike" baseline="0" dirty="0">
+            <a:endParaRPr lang="en-US" sz="1200" b="0" i="0" u="none" strike="noStrike" baseline="0" dirty="0">
               <a:latin typeface="OpenSans"/>
             </a:endParaRPr>
           </a:p>
           <a:p>
             <a:pPr algn="l"/>
             <a:r>
-              <a:rPr lang="en-US" sz="1800" b="0" i="0" u="none" strike="noStrike" baseline="0" dirty="0">
+              <a:rPr lang="en-US" sz="1200" b="0" i="0" u="none" strike="noStrike" baseline="0" dirty="0">
                 <a:latin typeface="OpenSans"/>
               </a:rPr>
               <a:t>3. The trained discriminative network classifies whether the image that is fed in is fake or real.</a:t>
@@ -988,14 +989,14 @@
           </a:p>
           <a:p>
             <a:pPr algn="l"/>
-            <a:endParaRPr lang="en-US" sz="1800" b="0" i="0" u="none" strike="noStrike" baseline="0" dirty="0">
+            <a:endParaRPr lang="en-US" sz="1200" b="0" i="0" u="none" strike="noStrike" baseline="0" dirty="0">
               <a:latin typeface="OpenSans"/>
             </a:endParaRPr>
           </a:p>
           <a:p>
             <a:pPr algn="l"/>
             <a:r>
-              <a:rPr lang="en-US" sz="1800" b="0" i="0" u="none" strike="noStrike" baseline="0" dirty="0">
+              <a:rPr lang="en-US" sz="1200" b="0" i="0" u="none" strike="noStrike" baseline="0" dirty="0">
                 <a:latin typeface="OpenSans"/>
               </a:rPr>
               <a:t>4. A feedback loop (the diamond-shaped box) working through the backpropagation algorithm gives feedback to the generator network, thereby refining the parameters of the generator model.</a:t>
@@ -1003,18 +1004,22 @@
           </a:p>
           <a:p>
             <a:pPr algn="l"/>
-            <a:endParaRPr lang="en-US" sz="1800" b="0" i="0" u="none" strike="noStrike" baseline="0" dirty="0">
+            <a:endParaRPr lang="en-US" sz="1200" b="0" i="0" u="none" strike="noStrike" baseline="0" dirty="0">
               <a:latin typeface="OpenSans"/>
             </a:endParaRPr>
           </a:p>
           <a:p>
             <a:pPr algn="l"/>
             <a:r>
-              <a:rPr lang="en-US" sz="1800" b="0" i="0" u="none" strike="noStrike" baseline="0" dirty="0">
+              <a:rPr lang="en-US" sz="1200" b="0" i="0" u="none" strike="noStrike" baseline="0" dirty="0">
                 <a:latin typeface="OpenSans"/>
               </a:rPr>
               <a:t>5. The parameters continue to be refined until the discriminator network can’t discriminate between the fake images and the real ones. Now that we have an overview of each of the components, let's dive deeper and understand them better through a problem statement.</a:t>
             </a:r>
+            <a:endParaRPr lang="en-US" dirty="0"/>
+          </a:p>
+          <a:p>
+            <a:pPr algn="l"/>
             <a:endParaRPr lang="en-US" dirty="0"/>
           </a:p>
         </p:txBody>
@@ -1045,7 +1050,7 @@
     </p:spTree>
     <p:extLst>
       <p:ext uri="{BB962C8B-B14F-4D97-AF65-F5344CB8AC3E}">
-        <p14:creationId xmlns:p14="http://schemas.microsoft.com/office/powerpoint/2010/main" val="7792111"/>
+        <p14:creationId xmlns:p14="http://schemas.microsoft.com/office/powerpoint/2010/main" val="157207674"/>
       </p:ext>
     </p:extLst>
   </p:cSld>
@@ -1100,7 +1105,10 @@
           <a:lstStyle/>
           <a:p>
             <a:pPr algn="l"/>
-            <a:endParaRPr lang="en-US" dirty="0"/>
+            <a:r>
+              <a:rPr lang="en-US" dirty="0"/>
+              <a:t>The four steps to create a GAN are listed here.</a:t>
+            </a:r>
           </a:p>
         </p:txBody>
       </p:sp>
@@ -1130,7 +1138,7 @@
     </p:spTree>
     <p:extLst>
       <p:ext uri="{BB962C8B-B14F-4D97-AF65-F5344CB8AC3E}">
-        <p14:creationId xmlns:p14="http://schemas.microsoft.com/office/powerpoint/2010/main" val="157207674"/>
+        <p14:creationId xmlns:p14="http://schemas.microsoft.com/office/powerpoint/2010/main" val="2661021272"/>
       </p:ext>
     </p:extLst>
   </p:cSld>
@@ -1184,15 +1192,23 @@
           <a:bodyPr/>
           <a:lstStyle/>
           <a:p>
-            <a:pPr algn="l"/>
-            <a:r>
-              <a:rPr lang="en-US" dirty="0"/>
-              <a:t>The steps to create a GAN </a:t>
-            </a:r>
-            <a:r>
-              <a:rPr lang="en-US"/>
-              <a:t>are listed here.</a:t>
-            </a:r>
+            <a:pPr marL="0" marR="0" lvl="0" indent="0" algn="l" defTabSz="914400" rtl="0" eaLnBrk="1" fontAlgn="auto" latinLnBrk="0" hangingPunct="1">
+              <a:lnSpc>
+                <a:spcPct val="100000"/>
+              </a:lnSpc>
+              <a:spcBef>
+                <a:spcPts val="0"/>
+              </a:spcBef>
+              <a:spcAft>
+                <a:spcPts val="0"/>
+              </a:spcAft>
+              <a:buClrTx/>
+              <a:buSzTx/>
+              <a:buFontTx/>
+              <a:buNone/>
+              <a:tabLst/>
+              <a:defRPr/>
+            </a:pPr>
             <a:endParaRPr lang="en-US" dirty="0"/>
           </a:p>
         </p:txBody>
@@ -1223,7 +1239,7 @@
     </p:spTree>
     <p:extLst>
       <p:ext uri="{BB962C8B-B14F-4D97-AF65-F5344CB8AC3E}">
-        <p14:creationId xmlns:p14="http://schemas.microsoft.com/office/powerpoint/2010/main" val="2661021272"/>
+        <p14:creationId xmlns:p14="http://schemas.microsoft.com/office/powerpoint/2010/main" val="1985664105"/>
       </p:ext>
     </p:extLst>
   </p:cSld>
@@ -1277,23 +1293,6 @@
           <a:bodyPr/>
           <a:lstStyle/>
           <a:p>
-            <a:pPr marL="0" marR="0" lvl="0" indent="0" algn="l" defTabSz="914400" rtl="0" eaLnBrk="1" fontAlgn="auto" latinLnBrk="0" hangingPunct="1">
-              <a:lnSpc>
-                <a:spcPct val="100000"/>
-              </a:lnSpc>
-              <a:spcBef>
-                <a:spcPts val="0"/>
-              </a:spcBef>
-              <a:spcAft>
-                <a:spcPts val="0"/>
-              </a:spcAft>
-              <a:buClrTx/>
-              <a:buSzTx/>
-              <a:buFontTx/>
-              <a:buNone/>
-              <a:tabLst/>
-              <a:defRPr/>
-            </a:pPr>
             <a:endParaRPr lang="en-US" dirty="0"/>
           </a:p>
         </p:txBody>
@@ -1324,7 +1323,7 @@
     </p:spTree>
     <p:extLst>
       <p:ext uri="{BB962C8B-B14F-4D97-AF65-F5344CB8AC3E}">
-        <p14:creationId xmlns:p14="http://schemas.microsoft.com/office/powerpoint/2010/main" val="1985664105"/>
+        <p14:creationId xmlns:p14="http://schemas.microsoft.com/office/powerpoint/2010/main" val="4007547773"/>
       </p:ext>
     </p:extLst>
   </p:cSld>
@@ -1465,7 +1464,10 @@
           <a:bodyPr/>
           <a:lstStyle/>
           <a:p>
-            <a:endParaRPr lang="en-US" dirty="0"/>
+            <a:r>
+              <a:rPr lang="en-US" dirty="0"/>
+              <a:t>Okay – let’s quickly summarize what we covered in today’s workshop.</a:t>
+            </a:r>
           </a:p>
         </p:txBody>
       </p:sp>
@@ -1495,7 +1497,92 @@
     </p:spTree>
     <p:extLst>
       <p:ext uri="{BB962C8B-B14F-4D97-AF65-F5344CB8AC3E}">
-        <p14:creationId xmlns:p14="http://schemas.microsoft.com/office/powerpoint/2010/main" val="4007547773"/>
+        <p14:creationId xmlns:p14="http://schemas.microsoft.com/office/powerpoint/2010/main" val="2339601520"/>
+      </p:ext>
+    </p:extLst>
+  </p:cSld>
+  <p:clrMapOvr>
+    <a:masterClrMapping/>
+  </p:clrMapOvr>
+</p:notes>
+</file>
+
+<file path=ppt/notesSlides/notesSlide9.xml><?xml version="1.0" encoding="utf-8"?>
+<p:notes xmlns:a="http://schemas.openxmlformats.org/drawingml/2006/main" xmlns:r="http://schemas.openxmlformats.org/officeDocument/2006/relationships" xmlns:p="http://schemas.openxmlformats.org/presentationml/2006/main">
+  <p:cSld>
+    <p:spTree>
+      <p:nvGrpSpPr>
+        <p:cNvPr id="1" name=""/>
+        <p:cNvGrpSpPr/>
+        <p:nvPr/>
+      </p:nvGrpSpPr>
+      <p:grpSpPr>
+        <a:xfrm>
+          <a:off x="0" y="0"/>
+          <a:ext cx="0" cy="0"/>
+          <a:chOff x="0" y="0"/>
+          <a:chExt cx="0" cy="0"/>
+        </a:xfrm>
+      </p:grpSpPr>
+      <p:sp>
+        <p:nvSpPr>
+          <p:cNvPr id="2" name="Slide Image Placeholder 1"/>
+          <p:cNvSpPr>
+            <a:spLocks noGrp="1" noRot="1" noChangeAspect="1"/>
+          </p:cNvSpPr>
+          <p:nvPr>
+            <p:ph type="sldImg"/>
+          </p:nvPr>
+        </p:nvSpPr>
+        <p:spPr/>
+      </p:sp>
+      <p:sp>
+        <p:nvSpPr>
+          <p:cNvPr id="3" name="Notes Placeholder 2"/>
+          <p:cNvSpPr>
+            <a:spLocks noGrp="1"/>
+          </p:cNvSpPr>
+          <p:nvPr>
+            <p:ph type="body" idx="1"/>
+          </p:nvPr>
+        </p:nvSpPr>
+        <p:spPr/>
+        <p:txBody>
+          <a:bodyPr/>
+          <a:lstStyle/>
+          <a:p>
+            <a:pPr algn="l"/>
+            <a:endParaRPr lang="en-US" dirty="0"/>
+          </a:p>
+        </p:txBody>
+      </p:sp>
+      <p:sp>
+        <p:nvSpPr>
+          <p:cNvPr id="4" name="Slide Number Placeholder 3"/>
+          <p:cNvSpPr>
+            <a:spLocks noGrp="1"/>
+          </p:cNvSpPr>
+          <p:nvPr>
+            <p:ph type="sldNum" sz="quarter" idx="5"/>
+          </p:nvPr>
+        </p:nvSpPr>
+        <p:spPr/>
+        <p:txBody>
+          <a:bodyPr/>
+          <a:lstStyle/>
+          <a:p>
+            <a:fld id="{3148858F-F1DB-4027-9C85-CCA6849540DD}" type="slidenum">
+              <a:rPr lang="en-US" smtClean="0"/>
+              <a:t>9</a:t>
+            </a:fld>
+            <a:endParaRPr lang="en-US"/>
+          </a:p>
+        </p:txBody>
+      </p:sp>
+    </p:spTree>
+    <p:extLst>
+      <p:ext uri="{BB962C8B-B14F-4D97-AF65-F5344CB8AC3E}">
+        <p14:creationId xmlns:p14="http://schemas.microsoft.com/office/powerpoint/2010/main" val="7792111"/>
       </p:ext>
     </p:extLst>
   </p:cSld>
@@ -5058,78 +5145,6 @@
       </p:grpSpPr>
       <p:pic>
         <p:nvPicPr>
-          <p:cNvPr id="5" name="Picture 4">
-            <a:extLst>
-              <a:ext uri="{FF2B5EF4-FFF2-40B4-BE49-F238E27FC236}">
-                <a16:creationId xmlns:a16="http://schemas.microsoft.com/office/drawing/2014/main" id="{5456E4C9-1121-4D93-9B3C-E5C086FE1816}"/>
-              </a:ext>
-            </a:extLst>
-          </p:cNvPr>
-          <p:cNvPicPr>
-            <a:picLocks noChangeAspect="1"/>
-          </p:cNvPicPr>
-          <p:nvPr/>
-        </p:nvPicPr>
-        <p:blipFill>
-          <a:blip r:embed="rId3"/>
-          <a:stretch>
-            <a:fillRect/>
-          </a:stretch>
-        </p:blipFill>
-        <p:spPr>
-          <a:xfrm>
-            <a:off x="1609725" y="985837"/>
-            <a:ext cx="8972550" cy="4886325"/>
-          </a:xfrm>
-          <a:prstGeom prst="rect">
-            <a:avLst/>
-          </a:prstGeom>
-        </p:spPr>
-      </p:pic>
-    </p:spTree>
-    <p:extLst>
-      <p:ext uri="{BB962C8B-B14F-4D97-AF65-F5344CB8AC3E}">
-        <p14:creationId xmlns:p14="http://schemas.microsoft.com/office/powerpoint/2010/main" val="1291068763"/>
-      </p:ext>
-    </p:extLst>
-  </p:cSld>
-  <p:clrMapOvr>
-    <a:masterClrMapping/>
-  </p:clrMapOvr>
-  <mc:AlternateContent xmlns:mc="http://schemas.openxmlformats.org/markup-compatibility/2006" xmlns:p14="http://schemas.microsoft.com/office/powerpoint/2010/main">
-    <mc:Choice Requires="p14">
-      <p:transition spd="slow" p14:dur="3400">
-        <p14:reveal/>
-      </p:transition>
-    </mc:Choice>
-    <mc:Fallback xmlns="">
-      <p:transition spd="slow">
-        <p:fade/>
-      </p:transition>
-    </mc:Fallback>
-  </mc:AlternateContent>
-</p:sld>
-</file>
-
-<file path=ppt/slides/slide4.xml><?xml version="1.0" encoding="utf-8"?>
-<p:sld xmlns:a="http://schemas.openxmlformats.org/drawingml/2006/main" xmlns:r="http://schemas.openxmlformats.org/officeDocument/2006/relationships" xmlns:p="http://schemas.openxmlformats.org/presentationml/2006/main">
-  <p:cSld>
-    <p:spTree>
-      <p:nvGrpSpPr>
-        <p:cNvPr id="1" name=""/>
-        <p:cNvGrpSpPr/>
-        <p:nvPr/>
-      </p:nvGrpSpPr>
-      <p:grpSpPr>
-        <a:xfrm>
-          <a:off x="0" y="0"/>
-          <a:ext cx="0" cy="0"/>
-          <a:chOff x="0" y="0"/>
-          <a:chExt cx="0" cy="0"/>
-        </a:xfrm>
-      </p:grpSpPr>
-      <p:pic>
-        <p:nvPicPr>
           <p:cNvPr id="3" name="Picture 2">
             <a:extLst>
               <a:ext uri="{FF2B5EF4-FFF2-40B4-BE49-F238E27FC236}">
@@ -5152,6 +5167,72 @@
           <a:xfrm>
             <a:off x="1724025" y="833437"/>
             <a:ext cx="8743950" cy="5191125"/>
+          </a:xfrm>
+          <a:prstGeom prst="rect">
+            <a:avLst/>
+          </a:prstGeom>
+        </p:spPr>
+      </p:pic>
+      <p:pic>
+        <p:nvPicPr>
+          <p:cNvPr id="8" name="Picture 7">
+            <a:extLst>
+              <a:ext uri="{FF2B5EF4-FFF2-40B4-BE49-F238E27FC236}">
+                <a16:creationId xmlns:a16="http://schemas.microsoft.com/office/drawing/2014/main" id="{0C33F89E-FE36-4A85-B1C3-EFCE0E0DB656}"/>
+              </a:ext>
+            </a:extLst>
+          </p:cNvPr>
+          <p:cNvPicPr>
+            <a:picLocks noChangeAspect="1"/>
+          </p:cNvPicPr>
+          <p:nvPr/>
+        </p:nvPicPr>
+        <p:blipFill>
+          <a:blip r:embed="rId4">
+            <a:extLst>
+              <a:ext uri="{28A0092B-C50C-407E-A947-70E740481C1C}">
+                <a14:useLocalDpi xmlns:a14="http://schemas.microsoft.com/office/drawing/2010/main" val="0"/>
+              </a:ext>
+            </a:extLst>
+          </a:blip>
+          <a:stretch>
+            <a:fillRect/>
+          </a:stretch>
+        </p:blipFill>
+        <p:spPr>
+          <a:xfrm>
+            <a:off x="2904030" y="833437"/>
+            <a:ext cx="1212850" cy="806450"/>
+          </a:xfrm>
+          <a:prstGeom prst="rect">
+            <a:avLst/>
+          </a:prstGeom>
+        </p:spPr>
+      </p:pic>
+      <p:pic>
+        <p:nvPicPr>
+          <p:cNvPr id="10" name="Picture 9">
+            <a:extLst>
+              <a:ext uri="{FF2B5EF4-FFF2-40B4-BE49-F238E27FC236}">
+                <a16:creationId xmlns:a16="http://schemas.microsoft.com/office/drawing/2014/main" id="{FD5EDAD0-9DBC-4D5B-A602-D71F7FE94005}"/>
+              </a:ext>
+            </a:extLst>
+          </p:cNvPr>
+          <p:cNvPicPr>
+            <a:picLocks noChangeAspect="1"/>
+          </p:cNvPicPr>
+          <p:nvPr/>
+        </p:nvPicPr>
+        <p:blipFill>
+          <a:blip r:embed="rId5"/>
+          <a:stretch>
+            <a:fillRect/>
+          </a:stretch>
+        </p:blipFill>
+        <p:spPr>
+          <a:xfrm>
+            <a:off x="5667208" y="4671847"/>
+            <a:ext cx="786141" cy="615719"/>
           </a:xfrm>
           <a:prstGeom prst="rect">
             <a:avLst/>
@@ -5183,7 +5264,7 @@
 </p:sld>
 </file>
 
-<file path=ppt/slides/slide5.xml><?xml version="1.0" encoding="utf-8"?>
+<file path=ppt/slides/slide4.xml><?xml version="1.0" encoding="utf-8"?>
 <p:sld xmlns:a="http://schemas.openxmlformats.org/drawingml/2006/main" xmlns:r="http://schemas.openxmlformats.org/officeDocument/2006/relationships" xmlns:p="http://schemas.openxmlformats.org/presentationml/2006/main">
   <p:cSld>
     <p:spTree>
@@ -5255,6 +5336,90 @@
 </p:sld>
 </file>
 
+<file path=ppt/slides/slide5.xml><?xml version="1.0" encoding="utf-8"?>
+<p:sld xmlns:a="http://schemas.openxmlformats.org/drawingml/2006/main" xmlns:r="http://schemas.openxmlformats.org/officeDocument/2006/relationships" xmlns:p="http://schemas.openxmlformats.org/presentationml/2006/main">
+  <p:cSld>
+    <p:spTree>
+      <p:nvGrpSpPr>
+        <p:cNvPr id="1" name=""/>
+        <p:cNvGrpSpPr/>
+        <p:nvPr/>
+      </p:nvGrpSpPr>
+      <p:grpSpPr>
+        <a:xfrm>
+          <a:off x="0" y="0"/>
+          <a:ext cx="0" cy="0"/>
+          <a:chOff x="0" y="0"/>
+          <a:chExt cx="0" cy="0"/>
+        </a:xfrm>
+      </p:grpSpPr>
+      <p:sp>
+        <p:nvSpPr>
+          <p:cNvPr id="4" name="Title 3">
+            <a:extLst>
+              <a:ext uri="{FF2B5EF4-FFF2-40B4-BE49-F238E27FC236}">
+                <a16:creationId xmlns:a16="http://schemas.microsoft.com/office/drawing/2014/main" id="{A022B8E0-DD9C-49D7-82FB-ACD3443312AF}"/>
+              </a:ext>
+            </a:extLst>
+          </p:cNvPr>
+          <p:cNvSpPr>
+            <a:spLocks noGrp="1"/>
+          </p:cNvSpPr>
+          <p:nvPr>
+            <p:ph type="title"/>
+          </p:nvPr>
+        </p:nvSpPr>
+        <p:spPr>
+          <a:xfrm>
+            <a:off x="0" y="2766218"/>
+            <a:ext cx="12192000" cy="1325563"/>
+          </a:xfrm>
+        </p:spPr>
+        <p:txBody>
+          <a:bodyPr/>
+          <a:lstStyle/>
+          <a:p>
+            <a:pPr algn="ctr"/>
+            <a:r>
+              <a:rPr lang="en-US" sz="4400" dirty="0">
+                <a:solidFill>
+                  <a:srgbClr val="6C9AC3"/>
+                </a:solidFill>
+                <a:latin typeface="Palatino Linotype" panose="02040502050505030304" pitchFamily="18" charset="0"/>
+              </a:rPr>
+              <a:t>Exercise 7.01: </a:t>
+            </a:r>
+            <a:endParaRPr lang="en-US" dirty="0">
+              <a:latin typeface="Palatino Linotype" panose="02040502050505030304" pitchFamily="18" charset="0"/>
+            </a:endParaRPr>
+          </a:p>
+        </p:txBody>
+      </p:sp>
+    </p:spTree>
+    <p:extLst>
+      <p:ext uri="{BB962C8B-B14F-4D97-AF65-F5344CB8AC3E}">
+        <p14:creationId xmlns:p14="http://schemas.microsoft.com/office/powerpoint/2010/main" val="2261991877"/>
+      </p:ext>
+    </p:extLst>
+  </p:cSld>
+  <p:clrMapOvr>
+    <a:masterClrMapping/>
+  </p:clrMapOvr>
+  <mc:AlternateContent xmlns:mc="http://schemas.openxmlformats.org/markup-compatibility/2006" xmlns:p14="http://schemas.microsoft.com/office/powerpoint/2010/main">
+    <mc:Choice Requires="p14">
+      <p:transition spd="med" p14:dur="700">
+        <p:fade/>
+      </p:transition>
+    </mc:Choice>
+    <mc:Fallback xmlns="">
+      <p:transition spd="med">
+        <p:fade/>
+      </p:transition>
+    </mc:Fallback>
+  </mc:AlternateContent>
+</p:sld>
+</file>
+
 <file path=ppt/slides/slide6.xml><?xml version="1.0" encoding="utf-8"?>
 <p:sld xmlns:a="http://schemas.openxmlformats.org/drawingml/2006/main" xmlns:r="http://schemas.openxmlformats.org/officeDocument/2006/relationships" xmlns:p="http://schemas.openxmlformats.org/presentationml/2006/main">
   <p:cSld>
@@ -5274,50 +5439,197 @@
       </p:grpSpPr>
       <p:sp>
         <p:nvSpPr>
-          <p:cNvPr id="4" name="Title 3">
-            <a:extLst>
-              <a:ext uri="{FF2B5EF4-FFF2-40B4-BE49-F238E27FC236}">
-                <a16:creationId xmlns:a16="http://schemas.microsoft.com/office/drawing/2014/main" id="{A022B8E0-DD9C-49D7-82FB-ACD3443312AF}"/>
-              </a:ext>
-            </a:extLst>
-          </p:cNvPr>
-          <p:cNvSpPr>
-            <a:spLocks noGrp="1"/>
-          </p:cNvSpPr>
-          <p:nvPr>
-            <p:ph type="title"/>
-          </p:nvPr>
+          <p:cNvPr id="5" name="Title 1">
+            <a:extLst>
+              <a:ext uri="{FF2B5EF4-FFF2-40B4-BE49-F238E27FC236}">
+                <a16:creationId xmlns:a16="http://schemas.microsoft.com/office/drawing/2014/main" id="{8BABBCD2-7D2C-459F-9C42-17A2338F39A5}"/>
+              </a:ext>
+            </a:extLst>
+          </p:cNvPr>
+          <p:cNvSpPr txBox="1">
+            <a:spLocks/>
+          </p:cNvSpPr>
+          <p:nvPr/>
         </p:nvSpPr>
         <p:spPr>
           <a:xfrm>
-            <a:off x="0" y="2766218"/>
-            <a:ext cx="12192000" cy="1325563"/>
+            <a:off x="518616" y="447014"/>
+            <a:ext cx="11054686" cy="767638"/>
+          </a:xfrm>
+          <a:prstGeom prst="rect">
+            <a:avLst/>
+          </a:prstGeom>
+          <a:ln>
+            <a:noFill/>
+          </a:ln>
+        </p:spPr>
+        <p:txBody>
+          <a:bodyPr vert="horz" lIns="91440" tIns="45720" rIns="91440" bIns="45720" rtlCol="0" anchor="ctr">
+            <a:normAutofit/>
+          </a:bodyPr>
+          <a:lstStyle>
+            <a:lvl1pPr algn="l" defTabSz="914400" rtl="0" eaLnBrk="1" latinLnBrk="0" hangingPunct="1">
+              <a:lnSpc>
+                <a:spcPct val="90000"/>
+              </a:lnSpc>
+              <a:spcBef>
+                <a:spcPct val="0"/>
+              </a:spcBef>
+              <a:buNone/>
+              <a:defRPr sz="4400" kern="1200">
+                <a:solidFill>
+                  <a:schemeClr val="tx1"/>
+                </a:solidFill>
+                <a:latin typeface="+mj-lt"/>
+                <a:ea typeface="+mj-ea"/>
+                <a:cs typeface="+mj-cs"/>
+              </a:defRPr>
+            </a:lvl1pPr>
+          </a:lstStyle>
+          <a:p>
+            <a:pPr algn="ctr"/>
+            <a:r>
+              <a:rPr lang="en-US" dirty="0">
+                <a:latin typeface="Palatino Linotype" panose="02040502050505030304" pitchFamily="18" charset="0"/>
+                <a:cs typeface="Segoe UI Light" panose="020B0502040204020203" pitchFamily="34" charset="0"/>
+              </a:rPr>
+              <a:t>References</a:t>
+            </a:r>
+          </a:p>
+        </p:txBody>
+      </p:sp>
+      <p:sp>
+        <p:nvSpPr>
+          <p:cNvPr id="4" name="Content Placeholder 3">
+            <a:extLst>
+              <a:ext uri="{FF2B5EF4-FFF2-40B4-BE49-F238E27FC236}">
+                <a16:creationId xmlns:a16="http://schemas.microsoft.com/office/drawing/2014/main" id="{20414504-ECEC-4701-8B42-B13F0354C16C}"/>
+              </a:ext>
+            </a:extLst>
+          </p:cNvPr>
+          <p:cNvSpPr>
+            <a:spLocks noGrp="1"/>
+          </p:cNvSpPr>
+          <p:nvPr>
+            <p:ph sz="half" idx="1"/>
+          </p:nvPr>
+        </p:nvSpPr>
+        <p:spPr>
+          <a:xfrm>
+            <a:off x="838200" y="1364105"/>
+            <a:ext cx="10546582" cy="4812859"/>
           </a:xfrm>
         </p:spPr>
         <p:txBody>
-          <a:bodyPr/>
-          <a:lstStyle/>
-          <a:p>
-            <a:pPr algn="ctr"/>
-            <a:r>
-              <a:rPr lang="en-US" sz="4400" dirty="0">
-                <a:solidFill>
-                  <a:srgbClr val="6C9AC3"/>
-                </a:solidFill>
+          <a:bodyPr>
+            <a:normAutofit/>
+          </a:bodyPr>
+          <a:lstStyle/>
+          <a:p>
+            <a:pPr marL="0" indent="0">
+              <a:buNone/>
+            </a:pPr>
+            <a:r>
+              <a:rPr lang="en-US" sz="2400" i="1" dirty="0">
                 <a:latin typeface="Palatino Linotype" panose="02040502050505030304" pitchFamily="18" charset="0"/>
               </a:rPr>
-              <a:t>Exercise 7.01: </a:t>
-            </a:r>
-            <a:endParaRPr lang="en-US" dirty="0">
+              <a:t>      </a:t>
+            </a:r>
+            <a:endParaRPr lang="en-US" sz="2400" dirty="0">
               <a:latin typeface="Palatino Linotype" panose="02040502050505030304" pitchFamily="18" charset="0"/>
             </a:endParaRPr>
+          </a:p>
+          <a:p>
+            <a:pPr>
+              <a:lnSpc>
+                <a:spcPct val="100000"/>
+              </a:lnSpc>
+              <a:spcBef>
+                <a:spcPts val="0"/>
+              </a:spcBef>
+              <a:buFont typeface="Courier New" panose="02070309020205020404" pitchFamily="49" charset="0"/>
+              <a:buChar char="o"/>
+            </a:pPr>
+            <a:r>
+              <a:rPr lang="en-US" sz="2400" dirty="0">
+                <a:latin typeface="Palatino Linotype" panose="02040502050505030304" pitchFamily="18" charset="0"/>
+              </a:rPr>
+              <a:t> Baig, M. R., et al (2020). </a:t>
+            </a:r>
+            <a:r>
+              <a:rPr lang="en-US" sz="2400" i="1" dirty="0">
+                <a:latin typeface="Palatino Linotype" panose="02040502050505030304" pitchFamily="18" charset="0"/>
+              </a:rPr>
+              <a:t>The Deep Learning Workshop.  </a:t>
+            </a:r>
+            <a:r>
+              <a:rPr lang="en-US" sz="2400" dirty="0">
+                <a:latin typeface="Palatino Linotype" panose="02040502050505030304" pitchFamily="18" charset="0"/>
+              </a:rPr>
+              <a:t>Birmingham,</a:t>
+            </a:r>
+          </a:p>
+          <a:p>
+            <a:pPr marL="0" indent="0">
+              <a:lnSpc>
+                <a:spcPct val="100000"/>
+              </a:lnSpc>
+              <a:spcBef>
+                <a:spcPts val="0"/>
+              </a:spcBef>
+              <a:buNone/>
+            </a:pPr>
+            <a:r>
+              <a:rPr lang="en-US" sz="2400" dirty="0">
+                <a:latin typeface="Palatino Linotype" panose="02040502050505030304" pitchFamily="18" charset="0"/>
+              </a:rPr>
+              <a:t>    England: Packt Publishing.</a:t>
+            </a:r>
+            <a:r>
+              <a:rPr lang="en-US" sz="2400" i="1" dirty="0">
+                <a:latin typeface="Palatino Linotype" panose="02040502050505030304" pitchFamily="18" charset="0"/>
+              </a:rPr>
+              <a:t>                </a:t>
+            </a:r>
+            <a:endParaRPr lang="en-US" sz="2400" dirty="0">
+              <a:latin typeface="Palatino Linotype" panose="02040502050505030304" pitchFamily="18" charset="0"/>
+            </a:endParaRPr>
+          </a:p>
+          <a:p>
+            <a:pPr marL="0" indent="0">
+              <a:lnSpc>
+                <a:spcPct val="100000"/>
+              </a:lnSpc>
+              <a:spcBef>
+                <a:spcPts val="0"/>
+              </a:spcBef>
+              <a:buNone/>
+            </a:pPr>
+            <a:endParaRPr lang="en-US" sz="2400" dirty="0">
+              <a:latin typeface="Palatino Linotype" panose="02040502050505030304" pitchFamily="18" charset="0"/>
+            </a:endParaRPr>
+          </a:p>
+          <a:p>
+            <a:pPr marL="0" indent="0">
+              <a:lnSpc>
+                <a:spcPct val="100000"/>
+              </a:lnSpc>
+              <a:spcBef>
+                <a:spcPts val="0"/>
+              </a:spcBef>
+              <a:buNone/>
+            </a:pPr>
+            <a:br>
+              <a:rPr lang="en-US" dirty="0"/>
+            </a:br>
+            <a:endParaRPr lang="en-US" dirty="0"/>
           </a:p>
         </p:txBody>
       </p:sp>
     </p:spTree>
     <p:extLst>
       <p:ext uri="{BB962C8B-B14F-4D97-AF65-F5344CB8AC3E}">
-        <p14:creationId xmlns:p14="http://schemas.microsoft.com/office/powerpoint/2010/main" val="2261991877"/>
+        <p14:creationId xmlns:p14="http://schemas.microsoft.com/office/powerpoint/2010/main" val="1871367882"/>
       </p:ext>
     </p:extLst>
   </p:cSld>
@@ -5356,205 +5668,6 @@
           <a:chExt cx="0" cy="0"/>
         </a:xfrm>
       </p:grpSpPr>
-      <p:sp>
-        <p:nvSpPr>
-          <p:cNvPr id="5" name="Title 1">
-            <a:extLst>
-              <a:ext uri="{FF2B5EF4-FFF2-40B4-BE49-F238E27FC236}">
-                <a16:creationId xmlns:a16="http://schemas.microsoft.com/office/drawing/2014/main" id="{8BABBCD2-7D2C-459F-9C42-17A2338F39A5}"/>
-              </a:ext>
-            </a:extLst>
-          </p:cNvPr>
-          <p:cNvSpPr txBox="1">
-            <a:spLocks/>
-          </p:cNvSpPr>
-          <p:nvPr/>
-        </p:nvSpPr>
-        <p:spPr>
-          <a:xfrm>
-            <a:off x="518616" y="447014"/>
-            <a:ext cx="11054686" cy="767638"/>
-          </a:xfrm>
-          <a:prstGeom prst="rect">
-            <a:avLst/>
-          </a:prstGeom>
-          <a:ln>
-            <a:noFill/>
-          </a:ln>
-        </p:spPr>
-        <p:txBody>
-          <a:bodyPr vert="horz" lIns="91440" tIns="45720" rIns="91440" bIns="45720" rtlCol="0" anchor="ctr">
-            <a:normAutofit/>
-          </a:bodyPr>
-          <a:lstStyle>
-            <a:lvl1pPr algn="l" defTabSz="914400" rtl="0" eaLnBrk="1" latinLnBrk="0" hangingPunct="1">
-              <a:lnSpc>
-                <a:spcPct val="90000"/>
-              </a:lnSpc>
-              <a:spcBef>
-                <a:spcPct val="0"/>
-              </a:spcBef>
-              <a:buNone/>
-              <a:defRPr sz="4400" kern="1200">
-                <a:solidFill>
-                  <a:schemeClr val="tx1"/>
-                </a:solidFill>
-                <a:latin typeface="+mj-lt"/>
-                <a:ea typeface="+mj-ea"/>
-                <a:cs typeface="+mj-cs"/>
-              </a:defRPr>
-            </a:lvl1pPr>
-          </a:lstStyle>
-          <a:p>
-            <a:pPr algn="ctr"/>
-            <a:r>
-              <a:rPr lang="en-US" dirty="0">
-                <a:latin typeface="Palatino Linotype" panose="02040502050505030304" pitchFamily="18" charset="0"/>
-                <a:cs typeface="Segoe UI Light" panose="020B0502040204020203" pitchFamily="34" charset="0"/>
-              </a:rPr>
-              <a:t>Summary</a:t>
-            </a:r>
-          </a:p>
-        </p:txBody>
-      </p:sp>
-      <p:sp>
-        <p:nvSpPr>
-          <p:cNvPr id="4" name="Content Placeholder 3">
-            <a:extLst>
-              <a:ext uri="{FF2B5EF4-FFF2-40B4-BE49-F238E27FC236}">
-                <a16:creationId xmlns:a16="http://schemas.microsoft.com/office/drawing/2014/main" id="{20414504-ECEC-4701-8B42-B13F0354C16C}"/>
-              </a:ext>
-            </a:extLst>
-          </p:cNvPr>
-          <p:cNvSpPr>
-            <a:spLocks noGrp="1"/>
-          </p:cNvSpPr>
-          <p:nvPr>
-            <p:ph sz="half" idx="1"/>
-          </p:nvPr>
-        </p:nvSpPr>
-        <p:spPr>
-          <a:xfrm>
-            <a:off x="838200" y="1364105"/>
-            <a:ext cx="10546582" cy="5046881"/>
-          </a:xfrm>
-        </p:spPr>
-        <p:txBody>
-          <a:bodyPr>
-            <a:normAutofit/>
-          </a:bodyPr>
-          <a:lstStyle/>
-          <a:p>
-            <a:pPr marL="0" indent="0">
-              <a:buNone/>
-            </a:pPr>
-            <a:r>
-              <a:rPr lang="en-US" sz="2400" i="1" dirty="0">
-                <a:latin typeface="Palatino Linotype" panose="02040502050505030304" pitchFamily="18" charset="0"/>
-              </a:rPr>
-              <a:t>      </a:t>
-            </a:r>
-          </a:p>
-          <a:p>
-            <a:pPr marL="0" indent="0">
-              <a:buNone/>
-            </a:pPr>
-            <a:endParaRPr lang="en-US" sz="2400" dirty="0">
-              <a:latin typeface="Palatino Linotype" panose="02040502050505030304" pitchFamily="18" charset="0"/>
-            </a:endParaRPr>
-          </a:p>
-          <a:p>
-            <a:pPr>
-              <a:lnSpc>
-                <a:spcPct val="100000"/>
-              </a:lnSpc>
-              <a:spcBef>
-                <a:spcPts val="0"/>
-              </a:spcBef>
-              <a:buFont typeface="Courier New" panose="02070309020205020404" pitchFamily="49" charset="0"/>
-              <a:buChar char="o"/>
-            </a:pPr>
-            <a:r>
-              <a:rPr lang="en-US" sz="2400" dirty="0">
-                <a:latin typeface="Palatino Linotype" panose="02040502050505030304" pitchFamily="18" charset="0"/>
-              </a:rPr>
-              <a:t> </a:t>
-            </a:r>
-          </a:p>
-          <a:p>
-            <a:pPr>
-              <a:lnSpc>
-                <a:spcPct val="100000"/>
-              </a:lnSpc>
-              <a:spcBef>
-                <a:spcPts val="0"/>
-              </a:spcBef>
-              <a:buFont typeface="Courier New" panose="02070309020205020404" pitchFamily="49" charset="0"/>
-              <a:buChar char="o"/>
-            </a:pPr>
-            <a:r>
-              <a:rPr lang="en-US" sz="2400" dirty="0">
-                <a:latin typeface="Palatino Linotype" panose="02040502050505030304" pitchFamily="18" charset="0"/>
-              </a:rPr>
-              <a:t> </a:t>
-            </a:r>
-          </a:p>
-          <a:p>
-            <a:pPr>
-              <a:lnSpc>
-                <a:spcPct val="100000"/>
-              </a:lnSpc>
-              <a:spcBef>
-                <a:spcPts val="0"/>
-              </a:spcBef>
-              <a:buFont typeface="Courier New" panose="02070309020205020404" pitchFamily="49" charset="0"/>
-              <a:buChar char="o"/>
-            </a:pPr>
-            <a:r>
-              <a:rPr lang="en-US" sz="2400" dirty="0">
-                <a:latin typeface="Palatino Linotype" panose="02040502050505030304" pitchFamily="18" charset="0"/>
-              </a:rPr>
-              <a:t> </a:t>
-            </a:r>
-          </a:p>
-          <a:p>
-            <a:pPr>
-              <a:lnSpc>
-                <a:spcPct val="100000"/>
-              </a:lnSpc>
-              <a:spcBef>
-                <a:spcPts val="0"/>
-              </a:spcBef>
-              <a:buFont typeface="Courier New" panose="02070309020205020404" pitchFamily="49" charset="0"/>
-              <a:buChar char="o"/>
-            </a:pPr>
-            <a:r>
-              <a:rPr lang="en-US" sz="2400" dirty="0">
-                <a:latin typeface="Palatino Linotype" panose="02040502050505030304" pitchFamily="18" charset="0"/>
-              </a:rPr>
-              <a:t> </a:t>
-            </a:r>
-            <a:endParaRPr lang="en-US" dirty="0">
-              <a:latin typeface="Palatino Linotype" panose="02040502050505030304" pitchFamily="18" charset="0"/>
-            </a:endParaRPr>
-          </a:p>
-          <a:p>
-            <a:pPr marL="0" indent="0">
-              <a:lnSpc>
-                <a:spcPct val="100000"/>
-              </a:lnSpc>
-              <a:spcBef>
-                <a:spcPts val="0"/>
-              </a:spcBef>
-              <a:buNone/>
-            </a:pPr>
-            <a:br>
-              <a:rPr lang="en-US" dirty="0"/>
-            </a:br>
-            <a:endParaRPr lang="en-US" dirty="0"/>
-          </a:p>
-        </p:txBody>
-      </p:sp>
     </p:spTree>
     <p:extLst>
       <p:ext uri="{BB962C8B-B14F-4D97-AF65-F5344CB8AC3E}">
@@ -5653,7 +5766,7 @@
                 <a:latin typeface="Palatino Linotype" panose="02040502050505030304" pitchFamily="18" charset="0"/>
                 <a:cs typeface="Segoe UI Light" panose="020B0502040204020203" pitchFamily="34" charset="0"/>
               </a:rPr>
-              <a:t>References</a:t>
+              <a:t>Summary</a:t>
             </a:r>
           </a:p>
         </p:txBody>
@@ -5677,7 +5790,7 @@
         <p:spPr>
           <a:xfrm>
             <a:off x="838200" y="1364105"/>
-            <a:ext cx="10546582" cy="4812859"/>
+            <a:ext cx="10546582" cy="5046881"/>
           </a:xfrm>
         </p:spPr>
         <p:txBody>
@@ -5695,6 +5808,11 @@
               </a:rPr>
               <a:t>      </a:t>
             </a:r>
+          </a:p>
+          <a:p>
+            <a:pPr marL="0" indent="0">
+              <a:buNone/>
+            </a:pPr>
             <a:endParaRPr lang="en-US" sz="2400" dirty="0">
               <a:latin typeface="Palatino Linotype" panose="02040502050505030304" pitchFamily="18" charset="0"/>
             </a:endParaRPr>
@@ -5714,20 +5832,65 @@
               <a:rPr lang="en-US" sz="2400" dirty="0">
                 <a:latin typeface="Palatino Linotype" panose="02040502050505030304" pitchFamily="18" charset="0"/>
               </a:rPr>
-              <a:t> Baig, M. R., et al (2020). </a:t>
-            </a:r>
-            <a:r>
-              <a:rPr lang="en-US" sz="2400" i="1" dirty="0">
-                <a:latin typeface="Palatino Linotype" panose="02040502050505030304" pitchFamily="18" charset="0"/>
-              </a:rPr>
-              <a:t>The Deep Learning Workshop.  </a:t>
-            </a:r>
+              <a:t> </a:t>
+            </a:r>
+          </a:p>
+          <a:p>
+            <a:pPr>
+              <a:lnSpc>
+                <a:spcPct val="100000"/>
+              </a:lnSpc>
+              <a:spcBef>
+                <a:spcPts val="0"/>
+              </a:spcBef>
+              <a:buFont typeface="Courier New" panose="02070309020205020404" pitchFamily="49" charset="0"/>
+              <a:buChar char="o"/>
+            </a:pPr>
             <a:r>
               <a:rPr lang="en-US" sz="2400" dirty="0">
                 <a:latin typeface="Palatino Linotype" panose="02040502050505030304" pitchFamily="18" charset="0"/>
               </a:rPr>
-              <a:t>Birmingham,</a:t>
-            </a:r>
+              <a:t> </a:t>
+            </a:r>
+          </a:p>
+          <a:p>
+            <a:pPr>
+              <a:lnSpc>
+                <a:spcPct val="100000"/>
+              </a:lnSpc>
+              <a:spcBef>
+                <a:spcPts val="0"/>
+              </a:spcBef>
+              <a:buFont typeface="Courier New" panose="02070309020205020404" pitchFamily="49" charset="0"/>
+              <a:buChar char="o"/>
+            </a:pPr>
+            <a:r>
+              <a:rPr lang="en-US" sz="2400" dirty="0">
+                <a:latin typeface="Palatino Linotype" panose="02040502050505030304" pitchFamily="18" charset="0"/>
+              </a:rPr>
+              <a:t> </a:t>
+            </a:r>
+          </a:p>
+          <a:p>
+            <a:pPr>
+              <a:lnSpc>
+                <a:spcPct val="100000"/>
+              </a:lnSpc>
+              <a:spcBef>
+                <a:spcPts val="0"/>
+              </a:spcBef>
+              <a:buFont typeface="Courier New" panose="02070309020205020404" pitchFamily="49" charset="0"/>
+              <a:buChar char="o"/>
+            </a:pPr>
+            <a:r>
+              <a:rPr lang="en-US" sz="2400" dirty="0">
+                <a:latin typeface="Palatino Linotype" panose="02040502050505030304" pitchFamily="18" charset="0"/>
+              </a:rPr>
+              <a:t> </a:t>
+            </a:r>
+            <a:endParaRPr lang="en-US" dirty="0">
+              <a:latin typeface="Palatino Linotype" panose="02040502050505030304" pitchFamily="18" charset="0"/>
+            </a:endParaRPr>
           </a:p>
           <a:p>
             <a:pPr marL="0" indent="0">
@@ -5739,46 +5902,6 @@
               </a:spcBef>
               <a:buNone/>
             </a:pPr>
-            <a:r>
-              <a:rPr lang="en-US" sz="2400" dirty="0">
-                <a:latin typeface="Palatino Linotype" panose="02040502050505030304" pitchFamily="18" charset="0"/>
-              </a:rPr>
-              <a:t>    England: Packt Publishing.</a:t>
-            </a:r>
-            <a:r>
-              <a:rPr lang="en-US" sz="2400" i="1" dirty="0">
-                <a:latin typeface="Palatino Linotype" panose="02040502050505030304" pitchFamily="18" charset="0"/>
-              </a:rPr>
-              <a:t>                </a:t>
-            </a:r>
-            <a:endParaRPr lang="en-US" sz="2400" dirty="0">
-              <a:latin typeface="Palatino Linotype" panose="02040502050505030304" pitchFamily="18" charset="0"/>
-            </a:endParaRPr>
-          </a:p>
-          <a:p>
-            <a:pPr marL="0" indent="0">
-              <a:lnSpc>
-                <a:spcPct val="100000"/>
-              </a:lnSpc>
-              <a:spcBef>
-                <a:spcPts val="0"/>
-              </a:spcBef>
-              <a:buNone/>
-            </a:pPr>
-            <a:endParaRPr lang="en-US" sz="2400" dirty="0">
-              <a:latin typeface="Palatino Linotype" panose="02040502050505030304" pitchFamily="18" charset="0"/>
-            </a:endParaRPr>
-          </a:p>
-          <a:p>
-            <a:pPr marL="0" indent="0">
-              <a:lnSpc>
-                <a:spcPct val="100000"/>
-              </a:lnSpc>
-              <a:spcBef>
-                <a:spcPts val="0"/>
-              </a:spcBef>
-              <a:buNone/>
-            </a:pPr>
             <a:br>
               <a:rPr lang="en-US" dirty="0"/>
             </a:br>
@@ -5789,7 +5912,7 @@
     </p:spTree>
     <p:extLst>
       <p:ext uri="{BB962C8B-B14F-4D97-AF65-F5344CB8AC3E}">
-        <p14:creationId xmlns:p14="http://schemas.microsoft.com/office/powerpoint/2010/main" val="1871367882"/>
+        <p14:creationId xmlns:p14="http://schemas.microsoft.com/office/powerpoint/2010/main" val="1924173671"/>
       </p:ext>
     </p:extLst>
   </p:cSld>
@@ -5798,12 +5921,84 @@
   </p:clrMapOvr>
   <mc:AlternateContent xmlns:mc="http://schemas.openxmlformats.org/markup-compatibility/2006" xmlns:p14="http://schemas.microsoft.com/office/powerpoint/2010/main">
     <mc:Choice Requires="p14">
-      <p:transition spd="med" p14:dur="700">
-        <p:fade/>
+      <p:transition spd="slow" p14:dur="3400">
+        <p14:reveal/>
       </p:transition>
     </mc:Choice>
     <mc:Fallback xmlns="">
-      <p:transition spd="med">
+      <p:transition spd="slow">
+        <p:fade/>
+      </p:transition>
+    </mc:Fallback>
+  </mc:AlternateContent>
+</p:sld>
+</file>
+
+<file path=ppt/slides/slide9.xml><?xml version="1.0" encoding="utf-8"?>
+<p:sld xmlns:a="http://schemas.openxmlformats.org/drawingml/2006/main" xmlns:r="http://schemas.openxmlformats.org/officeDocument/2006/relationships" xmlns:p="http://schemas.openxmlformats.org/presentationml/2006/main">
+  <p:cSld>
+    <p:spTree>
+      <p:nvGrpSpPr>
+        <p:cNvPr id="1" name=""/>
+        <p:cNvGrpSpPr/>
+        <p:nvPr/>
+      </p:nvGrpSpPr>
+      <p:grpSpPr>
+        <a:xfrm>
+          <a:off x="0" y="0"/>
+          <a:ext cx="0" cy="0"/>
+          <a:chOff x="0" y="0"/>
+          <a:chExt cx="0" cy="0"/>
+        </a:xfrm>
+      </p:grpSpPr>
+      <p:pic>
+        <p:nvPicPr>
+          <p:cNvPr id="5" name="Picture 4">
+            <a:extLst>
+              <a:ext uri="{FF2B5EF4-FFF2-40B4-BE49-F238E27FC236}">
+                <a16:creationId xmlns:a16="http://schemas.microsoft.com/office/drawing/2014/main" id="{5456E4C9-1121-4D93-9B3C-E5C086FE1816}"/>
+              </a:ext>
+            </a:extLst>
+          </p:cNvPr>
+          <p:cNvPicPr>
+            <a:picLocks noChangeAspect="1"/>
+          </p:cNvPicPr>
+          <p:nvPr/>
+        </p:nvPicPr>
+        <p:blipFill>
+          <a:blip r:embed="rId3"/>
+          <a:stretch>
+            <a:fillRect/>
+          </a:stretch>
+        </p:blipFill>
+        <p:spPr>
+          <a:xfrm>
+            <a:off x="1609725" y="985837"/>
+            <a:ext cx="8972550" cy="4886325"/>
+          </a:xfrm>
+          <a:prstGeom prst="rect">
+            <a:avLst/>
+          </a:prstGeom>
+        </p:spPr>
+      </p:pic>
+    </p:spTree>
+    <p:extLst>
+      <p:ext uri="{BB962C8B-B14F-4D97-AF65-F5344CB8AC3E}">
+        <p14:creationId xmlns:p14="http://schemas.microsoft.com/office/powerpoint/2010/main" val="1291068763"/>
+      </p:ext>
+    </p:extLst>
+  </p:cSld>
+  <p:clrMapOvr>
+    <a:masterClrMapping/>
+  </p:clrMapOvr>
+  <mc:AlternateContent xmlns:mc="http://schemas.openxmlformats.org/markup-compatibility/2006" xmlns:p14="http://schemas.microsoft.com/office/powerpoint/2010/main">
+    <mc:Choice Requires="p14">
+      <p:transition spd="slow" p14:dur="3400">
+        <p14:reveal/>
+      </p:transition>
+    </mc:Choice>
+    <mc:Fallback xmlns="">
+      <p:transition spd="slow">
         <p:fade/>
       </p:transition>
     </mc:Fallback>

</xml_diff>

<commit_message>
Replaced the GAN diagram.
</commit_message>
<xml_diff>
--- a/gan_getting_started.pptx
+++ b/gan_getting_started.pptx
@@ -10,13 +10,13 @@
   <p:sldIdLst>
     <p:sldId id="257" r:id="rId2"/>
     <p:sldId id="307" r:id="rId3"/>
-    <p:sldId id="308" r:id="rId4"/>
+    <p:sldId id="262" r:id="rId4"/>
     <p:sldId id="309" r:id="rId5"/>
     <p:sldId id="279" r:id="rId6"/>
     <p:sldId id="306" r:id="rId7"/>
-    <p:sldId id="262" r:id="rId8"/>
-    <p:sldId id="310" r:id="rId9"/>
-    <p:sldId id="278" r:id="rId10"/>
+    <p:sldId id="308" r:id="rId8"/>
+    <p:sldId id="278" r:id="rId9"/>
+    <p:sldId id="310" r:id="rId10"/>
   </p:sldIdLst>
   <p:sldSz cx="12192000" cy="6858000"/>
   <p:notesSz cx="6858000" cy="9144000"/>
@@ -216,7 +216,7 @@
           <a:p>
             <a:fld id="{FD93C9B2-20F6-4DB1-B471-224337D0AC79}" type="datetimeFigureOut">
               <a:rPr lang="en-US" smtClean="0"/>
-              <a:t>8/25/2021</a:t>
+              <a:t>8/26/2021</a:t>
             </a:fld>
             <a:endParaRPr lang="en-US"/>
           </a:p>
@@ -1018,10 +1018,6 @@
             </a:r>
             <a:endParaRPr lang="en-US" dirty="0"/>
           </a:p>
-          <a:p>
-            <a:pPr algn="l"/>
-            <a:endParaRPr lang="en-US" dirty="0"/>
-          </a:p>
         </p:txBody>
       </p:sp>
       <p:sp>
@@ -1050,7 +1046,7 @@
     </p:spTree>
     <p:extLst>
       <p:ext uri="{BB962C8B-B14F-4D97-AF65-F5344CB8AC3E}">
-        <p14:creationId xmlns:p14="http://schemas.microsoft.com/office/powerpoint/2010/main" val="157207674"/>
+        <p14:creationId xmlns:p14="http://schemas.microsoft.com/office/powerpoint/2010/main" val="4007547773"/>
       </p:ext>
     </p:extLst>
   </p:cSld>
@@ -1377,10 +1373,8 @@
           <a:bodyPr/>
           <a:lstStyle/>
           <a:p>
-            <a:r>
-              <a:rPr lang="en-US" dirty="0"/>
-              <a:t>Okay – let’s quickly summarize what we covered in today’s workshop.</a:t>
-            </a:r>
+            <a:pPr algn="l"/>
+            <a:endParaRPr lang="en-US" dirty="0"/>
           </a:p>
         </p:txBody>
       </p:sp>
@@ -1410,7 +1404,7 @@
     </p:spTree>
     <p:extLst>
       <p:ext uri="{BB962C8B-B14F-4D97-AF65-F5344CB8AC3E}">
-        <p14:creationId xmlns:p14="http://schemas.microsoft.com/office/powerpoint/2010/main" val="4007547773"/>
+        <p14:creationId xmlns:p14="http://schemas.microsoft.com/office/powerpoint/2010/main" val="157207674"/>
       </p:ext>
     </p:extLst>
   </p:cSld>
@@ -1464,10 +1458,8 @@
           <a:bodyPr/>
           <a:lstStyle/>
           <a:p>
-            <a:r>
-              <a:rPr lang="en-US" dirty="0"/>
-              <a:t>Okay – let’s quickly summarize what we covered in today’s workshop.</a:t>
-            </a:r>
+            <a:pPr algn="l"/>
+            <a:endParaRPr lang="en-US" dirty="0"/>
           </a:p>
         </p:txBody>
       </p:sp>
@@ -1497,7 +1489,7 @@
     </p:spTree>
     <p:extLst>
       <p:ext uri="{BB962C8B-B14F-4D97-AF65-F5344CB8AC3E}">
-        <p14:creationId xmlns:p14="http://schemas.microsoft.com/office/powerpoint/2010/main" val="2339601520"/>
+        <p14:creationId xmlns:p14="http://schemas.microsoft.com/office/powerpoint/2010/main" val="7792111"/>
       </p:ext>
     </p:extLst>
   </p:cSld>
@@ -1551,8 +1543,10 @@
           <a:bodyPr/>
           <a:lstStyle/>
           <a:p>
-            <a:pPr algn="l"/>
-            <a:endParaRPr lang="en-US" dirty="0"/>
+            <a:r>
+              <a:rPr lang="en-US" dirty="0"/>
+              <a:t>Okay – let’s quickly summarize what we covered in today’s workshop.</a:t>
+            </a:r>
           </a:p>
         </p:txBody>
       </p:sp>
@@ -1582,7 +1576,7 @@
     </p:spTree>
     <p:extLst>
       <p:ext uri="{BB962C8B-B14F-4D97-AF65-F5344CB8AC3E}">
-        <p14:creationId xmlns:p14="http://schemas.microsoft.com/office/powerpoint/2010/main" val="7792111"/>
+        <p14:creationId xmlns:p14="http://schemas.microsoft.com/office/powerpoint/2010/main" val="2339601520"/>
       </p:ext>
     </p:extLst>
   </p:cSld>
@@ -1739,7 +1733,7 @@
           <a:p>
             <a:fld id="{C3F78080-8D0A-4BE8-A5B4-CB115102D524}" type="datetimeFigureOut">
               <a:rPr lang="en-US" smtClean="0"/>
-              <a:t>8/25/2021</a:t>
+              <a:t>8/26/2021</a:t>
             </a:fld>
             <a:endParaRPr lang="en-US"/>
           </a:p>
@@ -1937,7 +1931,7 @@
           <a:p>
             <a:fld id="{C3F78080-8D0A-4BE8-A5B4-CB115102D524}" type="datetimeFigureOut">
               <a:rPr lang="en-US" smtClean="0"/>
-              <a:t>8/25/2021</a:t>
+              <a:t>8/26/2021</a:t>
             </a:fld>
             <a:endParaRPr lang="en-US"/>
           </a:p>
@@ -2145,7 +2139,7 @@
           <a:p>
             <a:fld id="{C3F78080-8D0A-4BE8-A5B4-CB115102D524}" type="datetimeFigureOut">
               <a:rPr lang="en-US" smtClean="0"/>
-              <a:t>8/25/2021</a:t>
+              <a:t>8/26/2021</a:t>
             </a:fld>
             <a:endParaRPr lang="en-US"/>
           </a:p>
@@ -2343,7 +2337,7 @@
           <a:p>
             <a:fld id="{C3F78080-8D0A-4BE8-A5B4-CB115102D524}" type="datetimeFigureOut">
               <a:rPr lang="en-US" smtClean="0"/>
-              <a:t>8/25/2021</a:t>
+              <a:t>8/26/2021</a:t>
             </a:fld>
             <a:endParaRPr lang="en-US"/>
           </a:p>
@@ -2618,7 +2612,7 @@
           <a:p>
             <a:fld id="{C3F78080-8D0A-4BE8-A5B4-CB115102D524}" type="datetimeFigureOut">
               <a:rPr lang="en-US" smtClean="0"/>
-              <a:t>8/25/2021</a:t>
+              <a:t>8/26/2021</a:t>
             </a:fld>
             <a:endParaRPr lang="en-US"/>
           </a:p>
@@ -2883,7 +2877,7 @@
           <a:p>
             <a:fld id="{C3F78080-8D0A-4BE8-A5B4-CB115102D524}" type="datetimeFigureOut">
               <a:rPr lang="en-US" smtClean="0"/>
-              <a:t>8/25/2021</a:t>
+              <a:t>8/26/2021</a:t>
             </a:fld>
             <a:endParaRPr lang="en-US"/>
           </a:p>
@@ -3295,7 +3289,7 @@
           <a:p>
             <a:fld id="{C3F78080-8D0A-4BE8-A5B4-CB115102D524}" type="datetimeFigureOut">
               <a:rPr lang="en-US" smtClean="0"/>
-              <a:t>8/25/2021</a:t>
+              <a:t>8/26/2021</a:t>
             </a:fld>
             <a:endParaRPr lang="en-US"/>
           </a:p>
@@ -3436,7 +3430,7 @@
           <a:p>
             <a:fld id="{C3F78080-8D0A-4BE8-A5B4-CB115102D524}" type="datetimeFigureOut">
               <a:rPr lang="en-US" smtClean="0"/>
-              <a:t>8/25/2021</a:t>
+              <a:t>8/26/2021</a:t>
             </a:fld>
             <a:endParaRPr lang="en-US"/>
           </a:p>
@@ -3549,7 +3543,7 @@
           <a:p>
             <a:fld id="{C3F78080-8D0A-4BE8-A5B4-CB115102D524}" type="datetimeFigureOut">
               <a:rPr lang="en-US" smtClean="0"/>
-              <a:t>8/25/2021</a:t>
+              <a:t>8/26/2021</a:t>
             </a:fld>
             <a:endParaRPr lang="en-US"/>
           </a:p>
@@ -3860,7 +3854,7 @@
           <a:p>
             <a:fld id="{C3F78080-8D0A-4BE8-A5B4-CB115102D524}" type="datetimeFigureOut">
               <a:rPr lang="en-US" smtClean="0"/>
-              <a:t>8/25/2021</a:t>
+              <a:t>8/26/2021</a:t>
             </a:fld>
             <a:endParaRPr lang="en-US"/>
           </a:p>
@@ -4148,7 +4142,7 @@
           <a:p>
             <a:fld id="{C3F78080-8D0A-4BE8-A5B4-CB115102D524}" type="datetimeFigureOut">
               <a:rPr lang="en-US" smtClean="0"/>
-              <a:t>8/25/2021</a:t>
+              <a:t>8/26/2021</a:t>
             </a:fld>
             <a:endParaRPr lang="en-US"/>
           </a:p>
@@ -4389,7 +4383,7 @@
           <a:p>
             <a:fld id="{C3F78080-8D0A-4BE8-A5B4-CB115102D524}" type="datetimeFigureOut">
               <a:rPr lang="en-US" smtClean="0"/>
-              <a:t>8/25/2021</a:t>
+              <a:t>8/26/2021</a:t>
             </a:fld>
             <a:endParaRPr lang="en-US"/>
           </a:p>
@@ -5132,10 +5126,10 @@
       </p:grpSpPr>
       <p:pic>
         <p:nvPicPr>
-          <p:cNvPr id="3" name="Picture 2">
-            <a:extLst>
-              <a:ext uri="{FF2B5EF4-FFF2-40B4-BE49-F238E27FC236}">
-                <a16:creationId xmlns:a16="http://schemas.microsoft.com/office/drawing/2014/main" id="{BD6D65F5-B8B0-4CBE-B3A6-AC6D8E28C299}"/>
+          <p:cNvPr id="3" name="Picture 2" descr="Diagram&#10;&#10;Description automatically generated">
+            <a:extLst>
+              <a:ext uri="{FF2B5EF4-FFF2-40B4-BE49-F238E27FC236}">
+                <a16:creationId xmlns:a16="http://schemas.microsoft.com/office/drawing/2014/main" id="{2A3108EF-2E96-4DFB-85D5-D9F78B25FDAC}"/>
               </a:ext>
             </a:extLst>
           </p:cNvPr>
@@ -5145,37 +5139,7 @@
           <p:nvPr/>
         </p:nvPicPr>
         <p:blipFill>
-          <a:blip r:embed="rId3"/>
-          <a:stretch>
-            <a:fillRect/>
-          </a:stretch>
-        </p:blipFill>
-        <p:spPr>
-          <a:xfrm>
-            <a:off x="1724025" y="833437"/>
-            <a:ext cx="8743950" cy="5191125"/>
-          </a:xfrm>
-          <a:prstGeom prst="rect">
-            <a:avLst/>
-          </a:prstGeom>
-        </p:spPr>
-      </p:pic>
-      <p:pic>
-        <p:nvPicPr>
-          <p:cNvPr id="8" name="Picture 7">
-            <a:extLst>
-              <a:ext uri="{FF2B5EF4-FFF2-40B4-BE49-F238E27FC236}">
-                <a16:creationId xmlns:a16="http://schemas.microsoft.com/office/drawing/2014/main" id="{0C33F89E-FE36-4A85-B1C3-EFCE0E0DB656}"/>
-              </a:ext>
-            </a:extLst>
-          </p:cNvPr>
-          <p:cNvPicPr>
-            <a:picLocks noChangeAspect="1"/>
-          </p:cNvPicPr>
-          <p:nvPr/>
-        </p:nvPicPr>
-        <p:blipFill>
-          <a:blip r:embed="rId4">
+          <a:blip r:embed="rId3">
             <a:extLst>
               <a:ext uri="{28A0092B-C50C-407E-A947-70E740481C1C}">
                 <a14:useLocalDpi xmlns:a14="http://schemas.microsoft.com/office/drawing/2010/main" val="0"/>
@@ -5188,38 +5152,8 @@
         </p:blipFill>
         <p:spPr>
           <a:xfrm>
-            <a:off x="2904030" y="833437"/>
-            <a:ext cx="1212850" cy="806450"/>
-          </a:xfrm>
-          <a:prstGeom prst="rect">
-            <a:avLst/>
-          </a:prstGeom>
-        </p:spPr>
-      </p:pic>
-      <p:pic>
-        <p:nvPicPr>
-          <p:cNvPr id="10" name="Picture 9">
-            <a:extLst>
-              <a:ext uri="{FF2B5EF4-FFF2-40B4-BE49-F238E27FC236}">
-                <a16:creationId xmlns:a16="http://schemas.microsoft.com/office/drawing/2014/main" id="{FD5EDAD0-9DBC-4D5B-A602-D71F7FE94005}"/>
-              </a:ext>
-            </a:extLst>
-          </p:cNvPr>
-          <p:cNvPicPr>
-            <a:picLocks noChangeAspect="1"/>
-          </p:cNvPicPr>
-          <p:nvPr/>
-        </p:nvPicPr>
-        <p:blipFill>
-          <a:blip r:embed="rId5"/>
-          <a:stretch>
-            <a:fillRect/>
-          </a:stretch>
-        </p:blipFill>
-        <p:spPr>
-          <a:xfrm>
-            <a:off x="5667208" y="4671847"/>
-            <a:ext cx="786141" cy="615719"/>
+            <a:off x="712866" y="400987"/>
+            <a:ext cx="10766268" cy="6056026"/>
           </a:xfrm>
           <a:prstGeom prst="rect">
             <a:avLst/>
@@ -5229,7 +5163,7 @@
     </p:spTree>
     <p:extLst>
       <p:ext uri="{BB962C8B-B14F-4D97-AF65-F5344CB8AC3E}">
-        <p14:creationId xmlns:p14="http://schemas.microsoft.com/office/powerpoint/2010/main" val="3848559915"/>
+        <p14:creationId xmlns:p14="http://schemas.microsoft.com/office/powerpoint/2010/main" val="2018001033"/>
       </p:ext>
     </p:extLst>
   </p:cSld>
@@ -5658,7 +5592,7 @@
     </p:spTree>
     <p:extLst>
       <p:ext uri="{BB962C8B-B14F-4D97-AF65-F5344CB8AC3E}">
-        <p14:creationId xmlns:p14="http://schemas.microsoft.com/office/powerpoint/2010/main" val="2018001033"/>
+        <p14:creationId xmlns:p14="http://schemas.microsoft.com/office/powerpoint/2010/main" val="3848559915"/>
       </p:ext>
     </p:extLst>
   </p:cSld>
@@ -5697,209 +5631,40 @@
           <a:chExt cx="0" cy="0"/>
         </a:xfrm>
       </p:grpSpPr>
-      <p:sp>
-        <p:nvSpPr>
-          <p:cNvPr id="5" name="Title 1">
-            <a:extLst>
-              <a:ext uri="{FF2B5EF4-FFF2-40B4-BE49-F238E27FC236}">
-                <a16:creationId xmlns:a16="http://schemas.microsoft.com/office/drawing/2014/main" id="{8BABBCD2-7D2C-459F-9C42-17A2338F39A5}"/>
-              </a:ext>
-            </a:extLst>
-          </p:cNvPr>
-          <p:cNvSpPr txBox="1">
-            <a:spLocks/>
-          </p:cNvSpPr>
+      <p:pic>
+        <p:nvPicPr>
+          <p:cNvPr id="5" name="Picture 4">
+            <a:extLst>
+              <a:ext uri="{FF2B5EF4-FFF2-40B4-BE49-F238E27FC236}">
+                <a16:creationId xmlns:a16="http://schemas.microsoft.com/office/drawing/2014/main" id="{5456E4C9-1121-4D93-9B3C-E5C086FE1816}"/>
+              </a:ext>
+            </a:extLst>
+          </p:cNvPr>
+          <p:cNvPicPr>
+            <a:picLocks noChangeAspect="1"/>
+          </p:cNvPicPr>
           <p:nvPr/>
-        </p:nvSpPr>
+        </p:nvPicPr>
+        <p:blipFill>
+          <a:blip r:embed="rId3"/>
+          <a:stretch>
+            <a:fillRect/>
+          </a:stretch>
+        </p:blipFill>
         <p:spPr>
           <a:xfrm>
-            <a:off x="518616" y="447014"/>
-            <a:ext cx="11054686" cy="767638"/>
+            <a:off x="1609725" y="985837"/>
+            <a:ext cx="8972550" cy="4886325"/>
           </a:xfrm>
           <a:prstGeom prst="rect">
             <a:avLst/>
           </a:prstGeom>
-          <a:ln>
-            <a:noFill/>
-          </a:ln>
         </p:spPr>
-        <p:txBody>
-          <a:bodyPr vert="horz" lIns="91440" tIns="45720" rIns="91440" bIns="45720" rtlCol="0" anchor="ctr">
-            <a:normAutofit/>
-          </a:bodyPr>
-          <a:lstStyle>
-            <a:lvl1pPr algn="l" defTabSz="914400" rtl="0" eaLnBrk="1" latinLnBrk="0" hangingPunct="1">
-              <a:lnSpc>
-                <a:spcPct val="90000"/>
-              </a:lnSpc>
-              <a:spcBef>
-                <a:spcPct val="0"/>
-              </a:spcBef>
-              <a:buNone/>
-              <a:defRPr sz="4400" kern="1200">
-                <a:solidFill>
-                  <a:schemeClr val="tx1"/>
-                </a:solidFill>
-                <a:latin typeface="+mj-lt"/>
-                <a:ea typeface="+mj-ea"/>
-                <a:cs typeface="+mj-cs"/>
-              </a:defRPr>
-            </a:lvl1pPr>
-          </a:lstStyle>
-          <a:p>
-            <a:pPr algn="ctr"/>
-            <a:r>
-              <a:rPr lang="en-US" dirty="0">
-                <a:latin typeface="Palatino Linotype" panose="02040502050505030304" pitchFamily="18" charset="0"/>
-                <a:cs typeface="Segoe UI Light" panose="020B0502040204020203" pitchFamily="34" charset="0"/>
-              </a:rPr>
-              <a:t>Summary</a:t>
-            </a:r>
-          </a:p>
-        </p:txBody>
-      </p:sp>
-      <p:sp>
-        <p:nvSpPr>
-          <p:cNvPr id="4" name="Content Placeholder 3">
-            <a:extLst>
-              <a:ext uri="{FF2B5EF4-FFF2-40B4-BE49-F238E27FC236}">
-                <a16:creationId xmlns:a16="http://schemas.microsoft.com/office/drawing/2014/main" id="{20414504-ECEC-4701-8B42-B13F0354C16C}"/>
-              </a:ext>
-            </a:extLst>
-          </p:cNvPr>
-          <p:cNvSpPr>
-            <a:spLocks noGrp="1"/>
-          </p:cNvSpPr>
-          <p:nvPr>
-            <p:ph sz="half" idx="1"/>
-          </p:nvPr>
-        </p:nvSpPr>
-        <p:spPr>
-          <a:xfrm>
-            <a:off x="838200" y="1364105"/>
-            <a:ext cx="10546582" cy="5046881"/>
-          </a:xfrm>
-        </p:spPr>
-        <p:txBody>
-          <a:bodyPr>
-            <a:normAutofit/>
-          </a:bodyPr>
-          <a:lstStyle/>
-          <a:p>
-            <a:pPr marL="0" indent="0">
-              <a:buNone/>
-            </a:pPr>
-            <a:r>
-              <a:rPr lang="en-US" sz="2400" i="1" dirty="0">
-                <a:latin typeface="Palatino Linotype" panose="02040502050505030304" pitchFamily="18" charset="0"/>
-              </a:rPr>
-              <a:t>      </a:t>
-            </a:r>
-          </a:p>
-          <a:p>
-            <a:pPr marL="0" indent="0">
-              <a:buNone/>
-            </a:pPr>
-            <a:endParaRPr lang="en-US" sz="2400" dirty="0">
-              <a:latin typeface="Palatino Linotype" panose="02040502050505030304" pitchFamily="18" charset="0"/>
-            </a:endParaRPr>
-          </a:p>
-          <a:p>
-            <a:pPr>
-              <a:lnSpc>
-                <a:spcPct val="100000"/>
-              </a:lnSpc>
-              <a:spcBef>
-                <a:spcPts val="0"/>
-              </a:spcBef>
-              <a:buFont typeface="Courier New" panose="02070309020205020404" pitchFamily="49" charset="0"/>
-              <a:buChar char="o"/>
-            </a:pPr>
-            <a:r>
-              <a:rPr lang="en-US" sz="2400" dirty="0">
-                <a:latin typeface="Palatino Linotype" panose="02040502050505030304" pitchFamily="18" charset="0"/>
-              </a:rPr>
-              <a:t> </a:t>
-            </a:r>
-          </a:p>
-          <a:p>
-            <a:pPr>
-              <a:lnSpc>
-                <a:spcPct val="100000"/>
-              </a:lnSpc>
-              <a:spcBef>
-                <a:spcPts val="0"/>
-              </a:spcBef>
-              <a:buFont typeface="Courier New" panose="02070309020205020404" pitchFamily="49" charset="0"/>
-              <a:buChar char="o"/>
-            </a:pPr>
-            <a:r>
-              <a:rPr lang="en-US" sz="2400" dirty="0">
-                <a:latin typeface="Palatino Linotype" panose="02040502050505030304" pitchFamily="18" charset="0"/>
-              </a:rPr>
-              <a:t> </a:t>
-            </a:r>
-          </a:p>
-          <a:p>
-            <a:pPr>
-              <a:lnSpc>
-                <a:spcPct val="100000"/>
-              </a:lnSpc>
-              <a:spcBef>
-                <a:spcPts val="0"/>
-              </a:spcBef>
-              <a:buFont typeface="Courier New" panose="02070309020205020404" pitchFamily="49" charset="0"/>
-              <a:buChar char="o"/>
-            </a:pPr>
-            <a:r>
-              <a:rPr lang="en-US" sz="2400" dirty="0">
-                <a:latin typeface="Palatino Linotype" panose="02040502050505030304" pitchFamily="18" charset="0"/>
-              </a:rPr>
-              <a:t> </a:t>
-            </a:r>
-          </a:p>
-          <a:p>
-            <a:pPr>
-              <a:lnSpc>
-                <a:spcPct val="100000"/>
-              </a:lnSpc>
-              <a:spcBef>
-                <a:spcPts val="0"/>
-              </a:spcBef>
-              <a:buFont typeface="Courier New" panose="02070309020205020404" pitchFamily="49" charset="0"/>
-              <a:buChar char="o"/>
-            </a:pPr>
-            <a:r>
-              <a:rPr lang="en-US" sz="2400" dirty="0">
-                <a:latin typeface="Palatino Linotype" panose="02040502050505030304" pitchFamily="18" charset="0"/>
-              </a:rPr>
-              <a:t> </a:t>
-            </a:r>
-            <a:endParaRPr lang="en-US" dirty="0">
-              <a:latin typeface="Palatino Linotype" panose="02040502050505030304" pitchFamily="18" charset="0"/>
-            </a:endParaRPr>
-          </a:p>
-          <a:p>
-            <a:pPr marL="0" indent="0">
-              <a:lnSpc>
-                <a:spcPct val="100000"/>
-              </a:lnSpc>
-              <a:spcBef>
-                <a:spcPts val="0"/>
-              </a:spcBef>
-              <a:buNone/>
-            </a:pPr>
-            <a:br>
-              <a:rPr lang="en-US" dirty="0"/>
-            </a:br>
-            <a:endParaRPr lang="en-US" dirty="0"/>
-          </a:p>
-        </p:txBody>
-      </p:sp>
+      </p:pic>
     </p:spTree>
     <p:extLst>
       <p:ext uri="{BB962C8B-B14F-4D97-AF65-F5344CB8AC3E}">
-        <p14:creationId xmlns:p14="http://schemas.microsoft.com/office/powerpoint/2010/main" val="1924173671"/>
+        <p14:creationId xmlns:p14="http://schemas.microsoft.com/office/powerpoint/2010/main" val="1291068763"/>
       </p:ext>
     </p:extLst>
   </p:cSld>
@@ -5938,40 +5703,209 @@
           <a:chExt cx="0" cy="0"/>
         </a:xfrm>
       </p:grpSpPr>
-      <p:pic>
-        <p:nvPicPr>
-          <p:cNvPr id="5" name="Picture 4">
-            <a:extLst>
-              <a:ext uri="{FF2B5EF4-FFF2-40B4-BE49-F238E27FC236}">
-                <a16:creationId xmlns:a16="http://schemas.microsoft.com/office/drawing/2014/main" id="{5456E4C9-1121-4D93-9B3C-E5C086FE1816}"/>
-              </a:ext>
-            </a:extLst>
-          </p:cNvPr>
-          <p:cNvPicPr>
-            <a:picLocks noChangeAspect="1"/>
-          </p:cNvPicPr>
+      <p:sp>
+        <p:nvSpPr>
+          <p:cNvPr id="5" name="Title 1">
+            <a:extLst>
+              <a:ext uri="{FF2B5EF4-FFF2-40B4-BE49-F238E27FC236}">
+                <a16:creationId xmlns:a16="http://schemas.microsoft.com/office/drawing/2014/main" id="{8BABBCD2-7D2C-459F-9C42-17A2338F39A5}"/>
+              </a:ext>
+            </a:extLst>
+          </p:cNvPr>
+          <p:cNvSpPr txBox="1">
+            <a:spLocks/>
+          </p:cNvSpPr>
           <p:nvPr/>
-        </p:nvPicPr>
-        <p:blipFill>
-          <a:blip r:embed="rId3"/>
-          <a:stretch>
-            <a:fillRect/>
-          </a:stretch>
-        </p:blipFill>
+        </p:nvSpPr>
         <p:spPr>
           <a:xfrm>
-            <a:off x="1609725" y="985837"/>
-            <a:ext cx="8972550" cy="4886325"/>
+            <a:off x="518616" y="447014"/>
+            <a:ext cx="11054686" cy="767638"/>
           </a:xfrm>
           <a:prstGeom prst="rect">
             <a:avLst/>
           </a:prstGeom>
+          <a:ln>
+            <a:noFill/>
+          </a:ln>
         </p:spPr>
-      </p:pic>
+        <p:txBody>
+          <a:bodyPr vert="horz" lIns="91440" tIns="45720" rIns="91440" bIns="45720" rtlCol="0" anchor="ctr">
+            <a:normAutofit/>
+          </a:bodyPr>
+          <a:lstStyle>
+            <a:lvl1pPr algn="l" defTabSz="914400" rtl="0" eaLnBrk="1" latinLnBrk="0" hangingPunct="1">
+              <a:lnSpc>
+                <a:spcPct val="90000"/>
+              </a:lnSpc>
+              <a:spcBef>
+                <a:spcPct val="0"/>
+              </a:spcBef>
+              <a:buNone/>
+              <a:defRPr sz="4400" kern="1200">
+                <a:solidFill>
+                  <a:schemeClr val="tx1"/>
+                </a:solidFill>
+                <a:latin typeface="+mj-lt"/>
+                <a:ea typeface="+mj-ea"/>
+                <a:cs typeface="+mj-cs"/>
+              </a:defRPr>
+            </a:lvl1pPr>
+          </a:lstStyle>
+          <a:p>
+            <a:pPr algn="ctr"/>
+            <a:r>
+              <a:rPr lang="en-US" dirty="0">
+                <a:latin typeface="Palatino Linotype" panose="02040502050505030304" pitchFamily="18" charset="0"/>
+                <a:cs typeface="Segoe UI Light" panose="020B0502040204020203" pitchFamily="34" charset="0"/>
+              </a:rPr>
+              <a:t>Summary</a:t>
+            </a:r>
+          </a:p>
+        </p:txBody>
+      </p:sp>
+      <p:sp>
+        <p:nvSpPr>
+          <p:cNvPr id="4" name="Content Placeholder 3">
+            <a:extLst>
+              <a:ext uri="{FF2B5EF4-FFF2-40B4-BE49-F238E27FC236}">
+                <a16:creationId xmlns:a16="http://schemas.microsoft.com/office/drawing/2014/main" id="{20414504-ECEC-4701-8B42-B13F0354C16C}"/>
+              </a:ext>
+            </a:extLst>
+          </p:cNvPr>
+          <p:cNvSpPr>
+            <a:spLocks noGrp="1"/>
+          </p:cNvSpPr>
+          <p:nvPr>
+            <p:ph sz="half" idx="1"/>
+          </p:nvPr>
+        </p:nvSpPr>
+        <p:spPr>
+          <a:xfrm>
+            <a:off x="838200" y="1364105"/>
+            <a:ext cx="10546582" cy="5046881"/>
+          </a:xfrm>
+        </p:spPr>
+        <p:txBody>
+          <a:bodyPr>
+            <a:normAutofit/>
+          </a:bodyPr>
+          <a:lstStyle/>
+          <a:p>
+            <a:pPr marL="0" indent="0">
+              <a:buNone/>
+            </a:pPr>
+            <a:r>
+              <a:rPr lang="en-US" sz="2400" i="1" dirty="0">
+                <a:latin typeface="Palatino Linotype" panose="02040502050505030304" pitchFamily="18" charset="0"/>
+              </a:rPr>
+              <a:t>      </a:t>
+            </a:r>
+          </a:p>
+          <a:p>
+            <a:pPr marL="0" indent="0">
+              <a:buNone/>
+            </a:pPr>
+            <a:endParaRPr lang="en-US" sz="2400" dirty="0">
+              <a:latin typeface="Palatino Linotype" panose="02040502050505030304" pitchFamily="18" charset="0"/>
+            </a:endParaRPr>
+          </a:p>
+          <a:p>
+            <a:pPr>
+              <a:lnSpc>
+                <a:spcPct val="100000"/>
+              </a:lnSpc>
+              <a:spcBef>
+                <a:spcPts val="0"/>
+              </a:spcBef>
+              <a:buFont typeface="Courier New" panose="02070309020205020404" pitchFamily="49" charset="0"/>
+              <a:buChar char="o"/>
+            </a:pPr>
+            <a:r>
+              <a:rPr lang="en-US" sz="2400" dirty="0">
+                <a:latin typeface="Palatino Linotype" panose="02040502050505030304" pitchFamily="18" charset="0"/>
+              </a:rPr>
+              <a:t> </a:t>
+            </a:r>
+          </a:p>
+          <a:p>
+            <a:pPr>
+              <a:lnSpc>
+                <a:spcPct val="100000"/>
+              </a:lnSpc>
+              <a:spcBef>
+                <a:spcPts val="0"/>
+              </a:spcBef>
+              <a:buFont typeface="Courier New" panose="02070309020205020404" pitchFamily="49" charset="0"/>
+              <a:buChar char="o"/>
+            </a:pPr>
+            <a:r>
+              <a:rPr lang="en-US" sz="2400" dirty="0">
+                <a:latin typeface="Palatino Linotype" panose="02040502050505030304" pitchFamily="18" charset="0"/>
+              </a:rPr>
+              <a:t> </a:t>
+            </a:r>
+          </a:p>
+          <a:p>
+            <a:pPr>
+              <a:lnSpc>
+                <a:spcPct val="100000"/>
+              </a:lnSpc>
+              <a:spcBef>
+                <a:spcPts val="0"/>
+              </a:spcBef>
+              <a:buFont typeface="Courier New" panose="02070309020205020404" pitchFamily="49" charset="0"/>
+              <a:buChar char="o"/>
+            </a:pPr>
+            <a:r>
+              <a:rPr lang="en-US" sz="2400" dirty="0">
+                <a:latin typeface="Palatino Linotype" panose="02040502050505030304" pitchFamily="18" charset="0"/>
+              </a:rPr>
+              <a:t> </a:t>
+            </a:r>
+          </a:p>
+          <a:p>
+            <a:pPr>
+              <a:lnSpc>
+                <a:spcPct val="100000"/>
+              </a:lnSpc>
+              <a:spcBef>
+                <a:spcPts val="0"/>
+              </a:spcBef>
+              <a:buFont typeface="Courier New" panose="02070309020205020404" pitchFamily="49" charset="0"/>
+              <a:buChar char="o"/>
+            </a:pPr>
+            <a:r>
+              <a:rPr lang="en-US" sz="2400" dirty="0">
+                <a:latin typeface="Palatino Linotype" panose="02040502050505030304" pitchFamily="18" charset="0"/>
+              </a:rPr>
+              <a:t> </a:t>
+            </a:r>
+            <a:endParaRPr lang="en-US" dirty="0">
+              <a:latin typeface="Palatino Linotype" panose="02040502050505030304" pitchFamily="18" charset="0"/>
+            </a:endParaRPr>
+          </a:p>
+          <a:p>
+            <a:pPr marL="0" indent="0">
+              <a:lnSpc>
+                <a:spcPct val="100000"/>
+              </a:lnSpc>
+              <a:spcBef>
+                <a:spcPts val="0"/>
+              </a:spcBef>
+              <a:buNone/>
+            </a:pPr>
+            <a:br>
+              <a:rPr lang="en-US" dirty="0"/>
+            </a:br>
+            <a:endParaRPr lang="en-US" dirty="0"/>
+          </a:p>
+        </p:txBody>
+      </p:sp>
     </p:spTree>
     <p:extLst>
       <p:ext uri="{BB962C8B-B14F-4D97-AF65-F5344CB8AC3E}">
-        <p14:creationId xmlns:p14="http://schemas.microsoft.com/office/powerpoint/2010/main" val="1291068763"/>
+        <p14:creationId xmlns:p14="http://schemas.microsoft.com/office/powerpoint/2010/main" val="1924173671"/>
       </p:ext>
     </p:extLst>
   </p:cSld>

</xml_diff>